<commit_message>
Almost Done, Just need a Chart
</commit_message>
<xml_diff>
--- a/Assignments/Semester2/E07-Poster.pptx
+++ b/Assignments/Semester2/E07-Poster.pptx
@@ -157,24 +157,6 @@
 
 <file path=ppt/comments/comment1.xml><?xml version="1.0" encoding="utf-8"?>
 <p:cmLst xmlns:a="http://schemas.openxmlformats.org/drawingml/2006/main" xmlns:r="http://schemas.openxmlformats.org/officeDocument/2006/relationships" xmlns:p="http://schemas.openxmlformats.org/presentationml/2006/main">
-  <p:cm authorId="2" dt="2020-04-13T14:39:26.607" idx="1">
-    <p:pos x="8766" y="8213"/>
-    <p:text>Fix diagram to match step above</p:text>
-    <p:extLst>
-      <p:ext uri="{C676402C-5697-4E1C-873F-D02D1690AC5C}">
-        <p15:threadingInfo xmlns:p15="http://schemas.microsoft.com/office/powerpoint/2012/main" timeZoneBias="240"/>
-      </p:ext>
-    </p:extLst>
-  </p:cm>
-  <p:cm authorId="2" dt="2020-04-13T14:42:53.166" idx="2">
-    <p:pos x="8771" y="16686"/>
-    <p:text>Too much white space. Fix Diagram</p:text>
-    <p:extLst>
-      <p:ext uri="{C676402C-5697-4E1C-873F-D02D1690AC5C}">
-        <p15:threadingInfo xmlns:p15="http://schemas.microsoft.com/office/powerpoint/2012/main" timeZoneBias="240"/>
-      </p:ext>
-    </p:extLst>
-  </p:cm>
   <p:cm authorId="2" dt="2020-04-13T14:45:44.840" idx="3">
     <p:pos x="17820" y="11100"/>
     <p:text>Maybe replace with a table of technologies.</p:text>
@@ -3415,8 +3397,10 @@
           <a:solidFill>
             <a:schemeClr val="bg1"/>
           </a:solidFill>
-          <a:ln w="127000">
-            <a:noFill/>
+          <a:ln w="12700">
+            <a:solidFill>
+              <a:schemeClr val="tx1"/>
+            </a:solidFill>
             <a:miter lim="800000"/>
             <a:headEnd/>
             <a:tailEnd/>
@@ -3443,36 +3427,6 @@
           </a:p>
         </p:txBody>
       </p:sp>
-      <p:pic>
-        <p:nvPicPr>
-          <p:cNvPr id="30" name="Picture 5" descr="A close up of a map&#10;&#10;Description generated with very high confidence">
-            <a:extLst>
-              <a:ext uri="{FF2B5EF4-FFF2-40B4-BE49-F238E27FC236}">
-                <a16:creationId xmlns:a16="http://schemas.microsoft.com/office/drawing/2014/main" id="{C2E055B8-7C53-4653-8ADE-40C836806DEC}"/>
-              </a:ext>
-            </a:extLst>
-          </p:cNvPr>
-          <p:cNvPicPr>
-            <a:picLocks noChangeAspect="1"/>
-          </p:cNvPicPr>
-          <p:nvPr/>
-        </p:nvPicPr>
-        <p:blipFill>
-          <a:blip r:embed="rId2"/>
-          <a:stretch>
-            <a:fillRect/>
-          </a:stretch>
-        </p:blipFill>
-        <p:spPr>
-          <a:xfrm>
-            <a:off x="1140770" y="26488305"/>
-            <a:ext cx="12783155" cy="4799655"/>
-          </a:xfrm>
-          <a:prstGeom prst="rect">
-            <a:avLst/>
-          </a:prstGeom>
-        </p:spPr>
-      </p:pic>
       <p:sp>
         <p:nvSpPr>
           <p:cNvPr id="74" name="Rectangle 73">
@@ -3498,8 +3452,10 @@
           <a:solidFill>
             <a:schemeClr val="bg1"/>
           </a:solidFill>
-          <a:ln w="127000">
-            <a:noFill/>
+          <a:ln w="12700">
+            <a:solidFill>
+              <a:schemeClr val="tx1"/>
+            </a:solidFill>
             <a:miter lim="800000"/>
             <a:headEnd/>
             <a:tailEnd/>
@@ -3545,8 +3501,8 @@
         </p:nvSpPr>
         <p:spPr bwMode="auto">
           <a:xfrm>
-            <a:off x="29693220" y="18862538"/>
-            <a:ext cx="13256875" cy="7315200"/>
+            <a:off x="29832540" y="21136037"/>
+            <a:ext cx="13256875" cy="5943600"/>
           </a:xfrm>
           <a:prstGeom prst="rect">
             <a:avLst/>
@@ -3554,8 +3510,10 @@
           <a:solidFill>
             <a:schemeClr val="bg1"/>
           </a:solidFill>
-          <a:ln w="127000">
-            <a:noFill/>
+          <a:ln w="12700">
+            <a:solidFill>
+              <a:schemeClr val="tx1"/>
+            </a:solidFill>
             <a:miter lim="800000"/>
             <a:headEnd/>
             <a:tailEnd/>
@@ -3614,12 +3572,12 @@
           <a:p>
             <a:pPr lvl="0" algn="ctr"/>
             <a:r>
-              <a:rPr lang="en-US" sz="4400" b="1"/>
+              <a:rPr lang="en-US" sz="4400" b="1" dirty="0"/>
               <a:t>Acknowledgements</a:t>
             </a:r>
           </a:p>
           <a:p>
-            <a:endParaRPr lang="en-US" sz="2200">
+            <a:endParaRPr lang="en-US" sz="2200" dirty="0">
               <a:solidFill>
                 <a:prstClr val="black"/>
               </a:solidFill>
@@ -3629,21 +3587,21 @@
           </a:p>
           <a:p>
             <a:r>
-              <a:rPr lang="en-US" sz="2200">
+              <a:rPr lang="en-US" sz="2200" dirty="0">
                 <a:latin typeface="Times New Roman"/>
                 <a:cs typeface="Times New Roman"/>
               </a:rPr>
               <a:t>We would like to thank Professor </a:t>
             </a:r>
             <a:r>
-              <a:rPr lang="en-US" sz="2200" err="1">
+              <a:rPr lang="en-US" sz="2200" dirty="0" err="1">
                 <a:latin typeface="Times New Roman"/>
                 <a:cs typeface="Times New Roman"/>
               </a:rPr>
               <a:t>Sabetto</a:t>
             </a:r>
             <a:r>
-              <a:rPr lang="en-US" sz="2200">
+              <a:rPr lang="en-US" sz="2200" dirty="0">
                 <a:latin typeface="Times New Roman"/>
                 <a:cs typeface="Times New Roman"/>
               </a:rPr>
@@ -3652,21 +3610,21 @@
           </a:p>
           <a:p>
             <a:r>
-              <a:rPr lang="en-US" sz="2200">
+              <a:rPr lang="en-US" sz="2200" dirty="0">
                 <a:latin typeface="Times New Roman"/>
                 <a:cs typeface="Times New Roman"/>
               </a:rPr>
               <a:t>We would like to thank Allision </a:t>
             </a:r>
             <a:r>
-              <a:rPr lang="en-US" sz="2200" err="1">
+              <a:rPr lang="en-US" sz="2200" dirty="0" err="1">
                 <a:latin typeface="Times New Roman"/>
                 <a:cs typeface="Times New Roman"/>
               </a:rPr>
               <a:t>Elfring</a:t>
             </a:r>
             <a:r>
-              <a:rPr lang="en-US" sz="2200">
+              <a:rPr lang="en-US" sz="2200" dirty="0">
                 <a:latin typeface="Times New Roman"/>
                 <a:cs typeface="Times New Roman"/>
               </a:rPr>
@@ -3674,7 +3632,7 @@
             </a:r>
           </a:p>
           <a:p>
-            <a:endParaRPr lang="en-US" sz="2200">
+            <a:endParaRPr lang="en-US" sz="2200" dirty="0">
               <a:latin typeface="Times New Roman"/>
               <a:cs typeface="Times New Roman"/>
             </a:endParaRPr>
@@ -3695,7 +3653,7 @@
         </p:nvSpPr>
         <p:spPr>
           <a:xfrm>
-            <a:off x="29681715" y="18700835"/>
+            <a:off x="29821035" y="20974334"/>
             <a:ext cx="13082429" cy="6001643"/>
           </a:xfrm>
           <a:prstGeom prst="rect">
@@ -3710,14 +3668,14 @@
           <a:p>
             <a:pPr algn="ctr"/>
             <a:r>
-              <a:rPr lang="en-US" sz="4400" b="1">
+              <a:rPr lang="en-US" sz="4400" b="1" dirty="0">
                 <a:solidFill>
                   <a:srgbClr val="1A3668"/>
                 </a:solidFill>
               </a:rPr>
               <a:t>References</a:t>
             </a:r>
-            <a:endParaRPr lang="en-US" sz="2200">
+            <a:endParaRPr lang="en-US" sz="2200" dirty="0">
               <a:solidFill>
                 <a:prstClr val="black"/>
               </a:solidFill>
@@ -3726,14 +3684,14 @@
             </a:endParaRPr>
           </a:p>
           <a:p>
-            <a:endParaRPr lang="en-US" sz="2200">
+            <a:endParaRPr lang="en-US" sz="2200" dirty="0">
               <a:ea typeface="+mn-lt"/>
               <a:cs typeface="+mn-lt"/>
             </a:endParaRPr>
           </a:p>
           <a:p>
             <a:r>
-              <a:rPr lang="en-US" sz="2200">
+              <a:rPr lang="en-US" sz="2200" dirty="0">
                 <a:latin typeface="Times New Roman"/>
                 <a:ea typeface="+mn-lt"/>
                 <a:cs typeface="Times New Roman"/>
@@ -3741,7 +3699,7 @@
               <a:t>[1] “</a:t>
             </a:r>
             <a:r>
-              <a:rPr lang="en-US" sz="2200" err="1">
+              <a:rPr lang="en-US" sz="2200" dirty="0" err="1">
                 <a:latin typeface="Times New Roman"/>
                 <a:ea typeface="+mn-lt"/>
                 <a:cs typeface="Times New Roman"/>
@@ -3749,7 +3707,7 @@
               <a:t>libssh</a:t>
             </a:r>
             <a:r>
-              <a:rPr lang="en-US" sz="2200">
+              <a:rPr lang="en-US" sz="2200" dirty="0">
                 <a:latin typeface="Times New Roman"/>
                 <a:ea typeface="+mn-lt"/>
                 <a:cs typeface="Times New Roman"/>
@@ -3757,7 +3715,7 @@
               <a:t> 0.9.3,” </a:t>
             </a:r>
             <a:r>
-              <a:rPr lang="en-US" sz="2200" err="1">
+              <a:rPr lang="en-US" sz="2200" dirty="0" err="1">
                 <a:latin typeface="Times New Roman"/>
                 <a:ea typeface="+mn-lt"/>
                 <a:cs typeface="Times New Roman"/>
@@ -3765,7 +3723,7 @@
               <a:t>libssh</a:t>
             </a:r>
             <a:r>
-              <a:rPr lang="en-US" sz="2200">
+              <a:rPr lang="en-US" sz="2200" dirty="0">
                 <a:latin typeface="Times New Roman"/>
                 <a:ea typeface="+mn-lt"/>
                 <a:cs typeface="Times New Roman"/>
@@ -3773,14 +3731,14 @@
               <a:t>. [Online]. Available: http://api.libssh.org/stable/. [Accessed: 16-Mar-2020]. </a:t>
             </a:r>
             <a:br>
-              <a:rPr lang="en-US" sz="2200">
+              <a:rPr lang="en-US" sz="2200" dirty="0">
                 <a:latin typeface="Times New Roman" panose="02020603050405020304" pitchFamily="18" charset="0"/>
                 <a:ea typeface="+mn-lt"/>
                 <a:cs typeface="Times New Roman" panose="02020603050405020304" pitchFamily="18" charset="0"/>
               </a:rPr>
             </a:br>
             <a:r>
-              <a:rPr lang="en-US" sz="2200">
+              <a:rPr lang="en-US" sz="2200" dirty="0">
                 <a:latin typeface="Times New Roman"/>
                 <a:ea typeface="+mn-lt"/>
                 <a:cs typeface="Times New Roman"/>
@@ -3788,7 +3746,7 @@
               <a:t>[2] R. </a:t>
             </a:r>
             <a:r>
-              <a:rPr lang="en-US" sz="2200" err="1">
+              <a:rPr lang="en-US" sz="2200" dirty="0" err="1">
                 <a:latin typeface="Times New Roman"/>
                 <a:ea typeface="+mn-lt"/>
                 <a:cs typeface="Times New Roman"/>
@@ -3796,7 +3754,7 @@
               <a:t>Geldreich</a:t>
             </a:r>
             <a:r>
-              <a:rPr lang="en-US" sz="2200">
+              <a:rPr lang="en-US" sz="2200" dirty="0">
                 <a:latin typeface="Times New Roman"/>
                 <a:ea typeface="+mn-lt"/>
                 <a:cs typeface="Times New Roman"/>
@@ -3804,7 +3762,7 @@
               <a:t>, “richgel999/</a:t>
             </a:r>
             <a:r>
-              <a:rPr lang="en-US" sz="2200" err="1">
+              <a:rPr lang="en-US" sz="2200" dirty="0" err="1">
                 <a:latin typeface="Times New Roman"/>
                 <a:ea typeface="+mn-lt"/>
                 <a:cs typeface="Times New Roman"/>
@@ -3812,7 +3770,7 @@
               <a:t>miniz</a:t>
             </a:r>
             <a:r>
-              <a:rPr lang="en-US" sz="2200">
+              <a:rPr lang="en-US" sz="2200" dirty="0">
                 <a:latin typeface="Times New Roman"/>
                 <a:ea typeface="+mn-lt"/>
                 <a:cs typeface="Times New Roman"/>
@@ -3820,7 +3778,7 @@
               <a:t>,” </a:t>
             </a:r>
             <a:r>
-              <a:rPr lang="en-US" sz="2200" i="1" err="1">
+              <a:rPr lang="en-US" sz="2200" i="1" dirty="0" err="1">
                 <a:latin typeface="Times New Roman"/>
                 <a:ea typeface="+mn-lt"/>
                 <a:cs typeface="Times New Roman"/>
@@ -3828,7 +3786,7 @@
               <a:t>Github</a:t>
             </a:r>
             <a:r>
-              <a:rPr lang="en-US" sz="2200">
+              <a:rPr lang="en-US" sz="2200" dirty="0">
                 <a:latin typeface="Times New Roman"/>
                 <a:ea typeface="+mn-lt"/>
                 <a:cs typeface="Times New Roman"/>
@@ -3836,14 +3794,14 @@
               <a:t>, 09-Mar-2020. [Online]. Available: https://github.com/richgel999/miniz. [Accessed: 16-Mar-2020].</a:t>
             </a:r>
             <a:br>
-              <a:rPr lang="en-US" sz="2200">
+              <a:rPr lang="en-US" sz="2200" dirty="0">
                 <a:latin typeface="Times New Roman" panose="02020603050405020304" pitchFamily="18" charset="0"/>
                 <a:ea typeface="+mn-lt"/>
                 <a:cs typeface="Times New Roman" panose="02020603050405020304" pitchFamily="18" charset="0"/>
               </a:rPr>
             </a:br>
             <a:r>
-              <a:rPr lang="en-US" sz="2200">
+              <a:rPr lang="en-US" sz="2200" dirty="0">
                 <a:latin typeface="Times New Roman"/>
                 <a:ea typeface="+mn-lt"/>
                 <a:cs typeface="Times New Roman"/>
@@ -3851,7 +3809,7 @@
               <a:t>[3] “Filesystem library,” </a:t>
             </a:r>
             <a:r>
-              <a:rPr lang="en-US" sz="2200" i="1">
+              <a:rPr lang="en-US" sz="2200" i="1" dirty="0">
                 <a:latin typeface="Times New Roman"/>
                 <a:ea typeface="+mn-lt"/>
                 <a:cs typeface="Times New Roman"/>
@@ -3859,7 +3817,7 @@
               <a:t>cppreference.com</a:t>
             </a:r>
             <a:r>
-              <a:rPr lang="en-US" sz="2200">
+              <a:rPr lang="en-US" sz="2200" dirty="0">
                 <a:latin typeface="Times New Roman"/>
                 <a:ea typeface="+mn-lt"/>
                 <a:cs typeface="Times New Roman"/>
@@ -3867,14 +3825,14 @@
               <a:t>, 15-Jun-2018. [Online]. Available: https://en.cppreference.com/w/cpp/experimental/fs. [Accessed: 16-Mar-2020].</a:t>
             </a:r>
             <a:br>
-              <a:rPr lang="en-US" sz="2200">
+              <a:rPr lang="en-US" sz="2200" dirty="0">
                 <a:latin typeface="Times New Roman" panose="02020603050405020304" pitchFamily="18" charset="0"/>
                 <a:ea typeface="+mn-lt"/>
                 <a:cs typeface="Times New Roman" panose="02020603050405020304" pitchFamily="18" charset="0"/>
               </a:rPr>
             </a:br>
             <a:r>
-              <a:rPr lang="en-US" sz="2200">
+              <a:rPr lang="en-US" sz="2200" dirty="0">
                 <a:latin typeface="Times New Roman"/>
                 <a:ea typeface="+mn-lt"/>
                 <a:cs typeface="Times New Roman"/>
@@ -3884,7 +3842,7 @@
           </a:p>
           <a:p>
             <a:r>
-              <a:rPr lang="en-US" sz="2200">
+              <a:rPr lang="en-US" sz="2200" dirty="0">
                 <a:latin typeface="Times New Roman"/>
                 <a:ea typeface="+mn-lt"/>
                 <a:cs typeface="Times New Roman"/>
@@ -3892,7 +3850,7 @@
               <a:t>[5] arno0x0x, “Windows </a:t>
             </a:r>
             <a:r>
-              <a:rPr lang="en-US" sz="2200" err="1">
+              <a:rPr lang="en-US" sz="2200" dirty="0" err="1">
                 <a:latin typeface="Times New Roman"/>
                 <a:ea typeface="+mn-lt"/>
                 <a:cs typeface="Times New Roman"/>
@@ -3900,7 +3858,7 @@
               <a:t>oneliners</a:t>
             </a:r>
             <a:r>
-              <a:rPr lang="en-US" sz="2200">
+              <a:rPr lang="en-US" sz="2200" dirty="0">
                 <a:latin typeface="Times New Roman"/>
                 <a:ea typeface="+mn-lt"/>
                 <a:cs typeface="Times New Roman"/>
@@ -3908,7 +3866,7 @@
               <a:t> to download remote payload and execute arbitrary code,” Windows </a:t>
             </a:r>
             <a:r>
-              <a:rPr lang="en-US" sz="2200" err="1">
+              <a:rPr lang="en-US" sz="2200" dirty="0" err="1">
                 <a:latin typeface="Times New Roman"/>
                 <a:ea typeface="+mn-lt"/>
                 <a:cs typeface="Times New Roman"/>
@@ -3916,14 +3874,14 @@
               <a:t>oneliners</a:t>
             </a:r>
             <a:r>
-              <a:rPr lang="en-US" sz="2200">
+              <a:rPr lang="en-US" sz="2200" dirty="0">
                 <a:latin typeface="Times New Roman"/>
                 <a:ea typeface="+mn-lt"/>
                 <a:cs typeface="Times New Roman"/>
               </a:rPr>
               <a:t> to download remote payload and execute arbitrary code, 18-Apr-2018. [Online]. Available: https://arno0x0x.wordpress.com/2017/11/20/windows-oneliners-to-download-remote-payload-and-execute-arbitrary-code/. [Accessed: 16-Mar-2020]. </a:t>
             </a:r>
-            <a:endParaRPr lang="en-US" sz="2200">
+            <a:endParaRPr lang="en-US" sz="2200" dirty="0">
               <a:latin typeface="Times New Roman"/>
               <a:cs typeface="Times New Roman"/>
             </a:endParaRPr>
@@ -3955,8 +3913,10 @@
           <a:solidFill>
             <a:schemeClr val="bg1"/>
           </a:solidFill>
-          <a:ln w="127000">
-            <a:noFill/>
+          <a:ln w="12700">
+            <a:solidFill>
+              <a:schemeClr val="tx1"/>
+            </a:solidFill>
             <a:miter lim="800000"/>
             <a:headEnd/>
             <a:tailEnd/>
@@ -4422,7 +4382,7 @@
         <p:spPr bwMode="auto">
           <a:xfrm>
             <a:off x="29816450" y="6436953"/>
-            <a:ext cx="13025869" cy="9890145"/>
+            <a:ext cx="13025869" cy="13372741"/>
           </a:xfrm>
           <a:prstGeom prst="rect">
             <a:avLst/>
@@ -4430,8 +4390,10 @@
           <a:solidFill>
             <a:schemeClr val="bg1"/>
           </a:solidFill>
-          <a:ln w="127000">
-            <a:noFill/>
+          <a:ln w="12700">
+            <a:solidFill>
+              <a:schemeClr val="tx1"/>
+            </a:solidFill>
             <a:miter lim="800000"/>
             <a:headEnd/>
             <a:tailEnd/>
@@ -4486,8 +4448,10 @@
           <a:solidFill>
             <a:srgbClr val="1A3668"/>
           </a:solidFill>
-          <a:ln w="127000">
-            <a:noFill/>
+          <a:ln w="12700">
+            <a:solidFill>
+              <a:schemeClr val="tx1"/>
+            </a:solidFill>
             <a:miter lim="800000"/>
             <a:headEnd/>
             <a:tailEnd/>
@@ -4542,8 +4506,10 @@
           <a:solidFill>
             <a:schemeClr val="bg1"/>
           </a:solidFill>
-          <a:ln w="127000">
-            <a:noFill/>
+          <a:ln w="12700">
+            <a:solidFill>
+              <a:schemeClr val="tx1"/>
+            </a:solidFill>
             <a:miter lim="800000"/>
             <a:headEnd/>
             <a:tailEnd/>
@@ -4588,13 +4554,13 @@
           <p:nvPr/>
         </p:nvPicPr>
         <p:blipFill>
-          <a:blip r:embed="rId3">
+          <a:blip r:embed="rId2">
             <a:extLst>
               <a:ext uri="{28A0092B-C50C-407E-A947-70E740481C1C}">
                 <a14:useLocalDpi xmlns:a14="http://schemas.microsoft.com/office/drawing/2010/main" val="0"/>
               </a:ext>
               <a:ext uri="{96DAC541-7B7A-43D3-8B79-37D633B846F1}">
-                <asvg:svgBlip xmlns:asvg="http://schemas.microsoft.com/office/drawing/2016/SVG/main" r:embed="rId4"/>
+                <asvg:svgBlip xmlns:asvg="http://schemas.microsoft.com/office/drawing/2016/SVG/main" r:embed="rId3"/>
               </a:ext>
             </a:extLst>
           </a:blip>
@@ -4667,7 +4633,7 @@
           <p:nvPr/>
         </p:nvPicPr>
         <p:blipFill>
-          <a:blip r:embed="rId5">
+          <a:blip r:embed="rId4">
             <a:extLst>
               <a:ext uri="{28A0092B-C50C-407E-A947-70E740481C1C}">
                 <a14:useLocalDpi xmlns:a14="http://schemas.microsoft.com/office/drawing/2010/main" val="0"/>
@@ -5052,7 +5018,7 @@
                 <a:ea typeface="+mn-lt"/>
                 <a:cs typeface="Times New Roman"/>
               </a:rPr>
-              <a:t>Loader is deployed on a client system</a:t>
+              <a:t>Loader is deployed on a client system and connects back to server (C&amp;C)</a:t>
             </a:r>
             <a:endParaRPr lang="en-US" sz="2200" dirty="0">
               <a:ea typeface="+mn-lt"/>
@@ -5069,7 +5035,7 @@
                 <a:ea typeface="+mn-lt"/>
                 <a:cs typeface="Times New Roman"/>
               </a:rPr>
-              <a:t>Loader connects back to the server (C&amp;C)</a:t>
+              <a:t>Packer compress and encrypts files to be sent to Loader</a:t>
             </a:r>
             <a:endParaRPr lang="en-US" sz="2200" dirty="0">
               <a:ea typeface="+mn-lt"/>
@@ -5086,7 +5052,7 @@
                 <a:ea typeface="+mn-lt"/>
                 <a:cs typeface="Times New Roman"/>
               </a:rPr>
-              <a:t>Loader fetches files/executables from the server</a:t>
+              <a:t>Packer send files to Loader</a:t>
             </a:r>
             <a:endParaRPr lang="en-US" sz="2200" dirty="0">
               <a:ea typeface="+mn-lt"/>
@@ -5309,7 +5275,7 @@
           <a:p>
             <a:pPr algn="ctr"/>
             <a:r>
-              <a:rPr lang="en-US" sz="4400" b="1">
+              <a:rPr lang="en-US" sz="4400" b="1" dirty="0">
                 <a:solidFill>
                   <a:srgbClr val="1A3668"/>
                 </a:solidFill>
@@ -5319,20 +5285,20 @@
             </a:r>
           </a:p>
           <a:p>
-            <a:endParaRPr lang="en-US" sz="2200">
+            <a:endParaRPr lang="en-US" sz="2200" dirty="0">
               <a:latin typeface="Times New Roman"/>
               <a:cs typeface="Times New Roman"/>
             </a:endParaRPr>
           </a:p>
           <a:p>
             <a:r>
-              <a:rPr lang="en-US" sz="2200">
+              <a:rPr lang="en-US" sz="2200" dirty="0">
                 <a:latin typeface="Times New Roman"/>
                 <a:cs typeface="Times New Roman"/>
               </a:rPr>
               <a:t>A delivered product!  Our packer and loader tool combo was delivered to our stakeholder.  Our product helped enable their mission and objectives.  We also provided the research we conducted along with the product.  As our assignment was both to conduct the research into the technology and develop the product, both we equally valuable.  We found that R&amp;D of such a product is quite difficult, especially in the area of executing code completely in memory.  We researched products that delivered similar solutions to ours.  From what we found, most only delivered a portion of our entire system.  E.g. one product advertises receiving data from remote systems and another specializes in code execution in memory.  Our product contained a lot of subsystems.  By researching the best methods specialized programs succeeded in building these subsystems, we were able to aggregate a successful full product.</a:t>
             </a:r>
-            <a:endParaRPr lang="en-US" sz="2200">
+            <a:endParaRPr lang="en-US" sz="2200" dirty="0">
               <a:solidFill>
                 <a:prstClr val="black"/>
               </a:solidFill>
@@ -5341,14 +5307,14 @@
             </a:endParaRPr>
           </a:p>
           <a:p>
-            <a:endParaRPr lang="en-US" sz="2200">
+            <a:endParaRPr lang="en-US" sz="2200" dirty="0">
               <a:latin typeface="Times New Roman"/>
               <a:cs typeface="Times New Roman"/>
             </a:endParaRPr>
           </a:p>
           <a:p>
             <a:r>
-              <a:rPr lang="en-US" sz="2200">
+              <a:rPr lang="en-US" sz="2200" dirty="0">
                 <a:latin typeface="Times New Roman"/>
                 <a:cs typeface="Times New Roman"/>
               </a:rPr>
@@ -5356,27 +5322,27 @@
             </a:r>
           </a:p>
           <a:p>
-            <a:endParaRPr lang="en-US" sz="2200">
+            <a:endParaRPr lang="en-US" sz="2200" dirty="0">
               <a:latin typeface="Times New Roman"/>
               <a:cs typeface="Times New Roman"/>
             </a:endParaRPr>
           </a:p>
           <a:p>
             <a:r>
-              <a:rPr lang="en-US" sz="2200" u="sng">
+              <a:rPr lang="en-US" sz="2200" u="sng" dirty="0">
                 <a:latin typeface="Times New Roman"/>
                 <a:cs typeface="Times New Roman"/>
               </a:rPr>
               <a:t>Lessons Learned</a:t>
             </a:r>
-            <a:endParaRPr lang="en-US" sz="2200">
+            <a:endParaRPr lang="en-US" sz="2200" dirty="0">
               <a:latin typeface="Times New Roman"/>
               <a:cs typeface="Times New Roman"/>
             </a:endParaRPr>
           </a:p>
           <a:p>
             <a:r>
-              <a:rPr lang="en-US" sz="2200">
+              <a:rPr lang="en-US" sz="2200" dirty="0">
                 <a:latin typeface="Times New Roman"/>
                 <a:cs typeface="Times New Roman"/>
               </a:rPr>
@@ -5385,7 +5351,7 @@
           </a:p>
           <a:p>
             <a:r>
-              <a:rPr lang="en-US" sz="2200">
+              <a:rPr lang="en-US" sz="2200" dirty="0">
                 <a:latin typeface="Times New Roman"/>
                 <a:cs typeface="Times New Roman"/>
               </a:rPr>
@@ -5394,7 +5360,7 @@
           </a:p>
           <a:p>
             <a:r>
-              <a:rPr lang="en-US" sz="2200">
+              <a:rPr lang="en-US" sz="2200" dirty="0">
                 <a:latin typeface="Times New Roman"/>
                 <a:cs typeface="Times New Roman"/>
               </a:rPr>
@@ -5402,62 +5368,62 @@
             </a:r>
           </a:p>
           <a:p>
-            <a:endParaRPr lang="en-US" sz="2200">
+            <a:endParaRPr lang="en-US" sz="2200" dirty="0">
               <a:latin typeface="Times New Roman"/>
               <a:cs typeface="Times New Roman"/>
             </a:endParaRPr>
           </a:p>
           <a:p>
-            <a:endParaRPr lang="en-US" sz="2200">
+            <a:endParaRPr lang="en-US" sz="2200" dirty="0">
               <a:latin typeface="Times New Roman"/>
               <a:cs typeface="Times New Roman"/>
             </a:endParaRPr>
           </a:p>
           <a:p>
             <a:r>
-              <a:rPr lang="en-US" sz="2200">
+              <a:rPr lang="en-US" sz="2200" dirty="0">
                 <a:latin typeface="Times New Roman"/>
                 <a:cs typeface="Times New Roman"/>
               </a:rPr>
               <a:t>-Large scale software development is hard</a:t>
             </a:r>
-            <a:endParaRPr lang="en-US" sz="2200">
+            <a:endParaRPr lang="en-US" sz="2200" dirty="0">
               <a:latin typeface="Times New Roman" panose="02020603050405020304" pitchFamily="18" charset="0"/>
               <a:cs typeface="Times New Roman" panose="02020603050405020304" pitchFamily="18" charset="0"/>
             </a:endParaRPr>
           </a:p>
           <a:p>
             <a:r>
-              <a:rPr lang="en-US" sz="2200">
+              <a:rPr lang="en-US" sz="2200" dirty="0">
                 <a:latin typeface="Times New Roman"/>
                 <a:cs typeface="Times New Roman"/>
               </a:rPr>
               <a:t>-Time Management is essential</a:t>
             </a:r>
-            <a:endParaRPr lang="en-US"/>
-          </a:p>
-          <a:p>
-            <a:r>
-              <a:rPr lang="en-US" sz="2200">
+            <a:endParaRPr lang="en-US" dirty="0"/>
+          </a:p>
+          <a:p>
+            <a:r>
+              <a:rPr lang="en-US" sz="2200" dirty="0">
                 <a:latin typeface="Times New Roman"/>
                 <a:cs typeface="Times New Roman"/>
               </a:rPr>
               <a:t>-Met spec/didn't </a:t>
             </a:r>
-            <a:endParaRPr lang="en-US"/>
-          </a:p>
-          <a:p>
-            <a:r>
-              <a:rPr lang="en-US" sz="2200">
+            <a:endParaRPr lang="en-US" dirty="0"/>
+          </a:p>
+          <a:p>
+            <a:r>
+              <a:rPr lang="en-US" sz="2200" dirty="0">
                 <a:latin typeface="Times New Roman"/>
                 <a:cs typeface="Times New Roman"/>
               </a:rPr>
               <a:t>-TBD</a:t>
             </a:r>
-            <a:endParaRPr lang="en-US"/>
-          </a:p>
-          <a:p>
-            <a:endParaRPr lang="en-US"/>
+            <a:endParaRPr lang="en-US" dirty="0"/>
+          </a:p>
+          <a:p>
+            <a:endParaRPr lang="en-US" dirty="0"/>
           </a:p>
         </p:txBody>
       </p:sp>
@@ -5476,7 +5442,7 @@
           <p:nvPr/>
         </p:nvPicPr>
         <p:blipFill>
-          <a:blip r:embed="rId6"/>
+          <a:blip r:embed="rId5"/>
           <a:stretch>
             <a:fillRect/>
           </a:stretch>
@@ -5526,7 +5492,7 @@
             <p:nvPr/>
           </p:nvPicPr>
           <p:blipFill>
-            <a:blip r:embed="rId7">
+            <a:blip r:embed="rId6">
               <a:extLst>
                 <a:ext uri="{28A0092B-C50C-407E-A947-70E740481C1C}">
                   <a14:useLocalDpi xmlns:a14="http://schemas.microsoft.com/office/drawing/2010/main" val="0"/>
@@ -5643,7 +5609,7 @@
           <a:p>
             <a:pPr algn="ctr"/>
             <a:r>
-              <a:rPr lang="en-US" sz="4400" b="1">
+              <a:rPr lang="en-US" sz="4400" b="1" dirty="0">
                 <a:solidFill>
                   <a:srgbClr val="1A3668"/>
                 </a:solidFill>
@@ -5653,7 +5619,7 @@
           </a:p>
           <a:p>
             <a:pPr lvl="0"/>
-            <a:endParaRPr lang="en-US" sz="2200">
+            <a:endParaRPr lang="en-US" sz="2200" dirty="0">
               <a:solidFill>
                 <a:prstClr val="black"/>
               </a:solidFill>
@@ -5664,7 +5630,7 @@
           <a:p>
             <a:pPr lvl="0"/>
             <a:r>
-              <a:rPr lang="en-US" sz="2200">
+              <a:rPr lang="en-US" sz="2200" dirty="0">
                 <a:latin typeface="Times New Roman"/>
                 <a:cs typeface="Calibri"/>
               </a:rPr>
@@ -5708,7 +5674,7 @@
             <p:nvPr/>
           </p:nvPicPr>
           <p:blipFill rotWithShape="1">
-            <a:blip r:embed="rId8">
+            <a:blip r:embed="rId7">
               <a:extLst>
                 <a:ext uri="{28A0092B-C50C-407E-A947-70E740481C1C}">
                   <a14:useLocalDpi xmlns:a14="http://schemas.microsoft.com/office/drawing/2010/main" val="0"/>
@@ -5779,86 +5745,6 @@
           </p:txBody>
         </p:sp>
       </p:grpSp>
-      <p:sp>
-        <p:nvSpPr>
-          <p:cNvPr id="43" name="TextBox 42">
-            <a:extLst>
-              <a:ext uri="{FF2B5EF4-FFF2-40B4-BE49-F238E27FC236}">
-                <a16:creationId xmlns:a16="http://schemas.microsoft.com/office/drawing/2014/main" id="{6F4AF7C4-DED8-4E64-85E7-6525D5C3BB5C}"/>
-              </a:ext>
-            </a:extLst>
-          </p:cNvPr>
-          <p:cNvSpPr txBox="1"/>
-          <p:nvPr/>
-        </p:nvSpPr>
-        <p:spPr>
-          <a:xfrm>
-            <a:off x="5352401" y="15742658"/>
-            <a:ext cx="3098281" cy="369332"/>
-          </a:xfrm>
-          <a:prstGeom prst="rect">
-            <a:avLst/>
-          </a:prstGeom>
-          <a:noFill/>
-        </p:spPr>
-        <p:txBody>
-          <a:bodyPr rot="0" spcFirstLastPara="0" vertOverflow="overflow" horzOverflow="overflow" vert="horz" wrap="square" lIns="91440" tIns="45720" rIns="91440" bIns="45720" numCol="1" spcCol="0" rtlCol="0" fromWordArt="0" anchor="t" anchorCtr="0" forceAA="0" compatLnSpc="1">
-            <a:prstTxWarp prst="textNoShape">
-              <a:avLst/>
-            </a:prstTxWarp>
-            <a:spAutoFit/>
-          </a:bodyPr>
-          <a:lstStyle/>
-          <a:p>
-            <a:r>
-              <a:rPr lang="en-US" i="1">
-                <a:cs typeface="Calibri"/>
-              </a:rPr>
-              <a:t>A screenshot of our help page.</a:t>
-            </a:r>
-          </a:p>
-        </p:txBody>
-      </p:sp>
-      <p:sp>
-        <p:nvSpPr>
-          <p:cNvPr id="44" name="TextBox 43">
-            <a:extLst>
-              <a:ext uri="{FF2B5EF4-FFF2-40B4-BE49-F238E27FC236}">
-                <a16:creationId xmlns:a16="http://schemas.microsoft.com/office/drawing/2014/main" id="{BBD0504E-BA7C-41F7-A18D-26C4B0506E72}"/>
-              </a:ext>
-            </a:extLst>
-          </p:cNvPr>
-          <p:cNvSpPr txBox="1"/>
-          <p:nvPr/>
-        </p:nvSpPr>
-        <p:spPr>
-          <a:xfrm>
-            <a:off x="6021804" y="30677675"/>
-            <a:ext cx="3098281" cy="369332"/>
-          </a:xfrm>
-          <a:prstGeom prst="rect">
-            <a:avLst/>
-          </a:prstGeom>
-          <a:noFill/>
-        </p:spPr>
-        <p:txBody>
-          <a:bodyPr rot="0" spcFirstLastPara="0" vertOverflow="overflow" horzOverflow="overflow" vert="horz" wrap="square" lIns="91440" tIns="45720" rIns="91440" bIns="45720" numCol="1" spcCol="0" rtlCol="0" fromWordArt="0" anchor="t" anchorCtr="0" forceAA="0" compatLnSpc="1">
-            <a:prstTxWarp prst="textNoShape">
-              <a:avLst/>
-            </a:prstTxWarp>
-            <a:spAutoFit/>
-          </a:bodyPr>
-          <a:lstStyle/>
-          <a:p>
-            <a:r>
-              <a:rPr lang="en-US" i="1">
-                <a:cs typeface="Calibri"/>
-              </a:rPr>
-              <a:t>A screenshot of our help page.</a:t>
-            </a:r>
-          </a:p>
-        </p:txBody>
-      </p:sp>
       <p:grpSp>
         <p:nvGrpSpPr>
           <p:cNvPr id="45" name="Group 44">
@@ -5894,7 +5780,7 @@
             <p:nvPr/>
           </p:nvPicPr>
           <p:blipFill rotWithShape="1">
-            <a:blip r:embed="rId9"/>
+            <a:blip r:embed="rId8"/>
             <a:srcRect b="21968"/>
             <a:stretch/>
           </p:blipFill>
@@ -5949,6 +5835,36 @@
           </p:txBody>
         </p:sp>
       </p:grpSp>
+      <p:pic>
+        <p:nvPicPr>
+          <p:cNvPr id="4" name="Picture 3">
+            <a:extLst>
+              <a:ext uri="{FF2B5EF4-FFF2-40B4-BE49-F238E27FC236}">
+                <a16:creationId xmlns:a16="http://schemas.microsoft.com/office/drawing/2014/main" id="{47B3B3A8-FD07-4AD5-83C5-40AC59D24165}"/>
+              </a:ext>
+            </a:extLst>
+          </p:cNvPr>
+          <p:cNvPicPr>
+            <a:picLocks noChangeAspect="1"/>
+          </p:cNvPicPr>
+          <p:nvPr/>
+        </p:nvPicPr>
+        <p:blipFill>
+          <a:blip r:embed="rId9"/>
+          <a:stretch>
+            <a:fillRect/>
+          </a:stretch>
+        </p:blipFill>
+        <p:spPr>
+          <a:xfrm>
+            <a:off x="3125863" y="25828166"/>
+            <a:ext cx="8972550" cy="6000750"/>
+          </a:xfrm>
+          <a:prstGeom prst="rect">
+            <a:avLst/>
+          </a:prstGeom>
+        </p:spPr>
+      </p:pic>
     </p:spTree>
     <p:extLst>
       <p:ext uri="{BB962C8B-B14F-4D97-AF65-F5344CB8AC3E}">

</xml_diff>